<commit_message>
Fixes scp -R/-r issue.
</commit_message>
<xml_diff>
--- a/ULI101-6.1.pptx
+++ b/ULI101-6.1.pptx
@@ -131,6 +131,43 @@
 </p:presentation>
 </file>
 
+<file path=ppt/revisionInfo.xml><?xml version="1.0" encoding="utf-8"?>
+<p1510:revInfo xmlns:a="http://schemas.openxmlformats.org/drawingml/2006/main" xmlns:r="http://schemas.openxmlformats.org/officeDocument/2006/relationships" xmlns:p1510="http://schemas.microsoft.com/office/powerpoint/2015/10/main">
+  <p1510:revLst>
+    <p1510:client id="{8B445BFE-A7C4-F344-9214-DBBC344D506C}" v="113" dt="2023-02-17T16:30:38.657"/>
+  </p1510:revLst>
+</p1510:revInfo>
+</file>
+
+<file path=ppt/changesInfos/changesInfo1.xml><?xml version="1.0" encoding="utf-8"?>
+<pc:chgInfo xmlns:a="http://schemas.openxmlformats.org/drawingml/2006/main" xmlns:r="http://schemas.openxmlformats.org/officeDocument/2006/relationships" xmlns:ac="http://schemas.microsoft.com/office/drawing/2013/main/command" xmlns:pc="http://schemas.microsoft.com/office/powerpoint/2013/main/command">
+  <pc:docChgLst>
+    <pc:chgData name="Chris Johnson" userId="ff589efc-7bdb-4c2a-ab65-6fce12576f74" providerId="ADAL" clId="{8B445BFE-A7C4-F344-9214-DBBC344D506C}"/>
+    <pc:docChg chg="custSel modSld">
+      <pc:chgData name="Chris Johnson" userId="ff589efc-7bdb-4c2a-ab65-6fce12576f74" providerId="ADAL" clId="{8B445BFE-A7C4-F344-9214-DBBC344D506C}" dt="2023-02-17T16:30:42.143" v="114" actId="14100"/>
+      <pc:docMkLst>
+        <pc:docMk/>
+      </pc:docMkLst>
+      <pc:sldChg chg="modSp mod modAnim">
+        <pc:chgData name="Chris Johnson" userId="ff589efc-7bdb-4c2a-ab65-6fce12576f74" providerId="ADAL" clId="{8B445BFE-A7C4-F344-9214-DBBC344D506C}" dt="2023-02-17T16:30:42.143" v="114" actId="14100"/>
+        <pc:sldMkLst>
+          <pc:docMk/>
+          <pc:sldMk cId="966407910" sldId="345"/>
+        </pc:sldMkLst>
+        <pc:spChg chg="mod">
+          <ac:chgData name="Chris Johnson" userId="ff589efc-7bdb-4c2a-ab65-6fce12576f74" providerId="ADAL" clId="{8B445BFE-A7C4-F344-9214-DBBC344D506C}" dt="2023-02-17T16:30:42.143" v="114" actId="14100"/>
+          <ac:spMkLst>
+            <pc:docMk/>
+            <pc:sldMk cId="966407910" sldId="345"/>
+            <ac:spMk id="3" creationId="{99DF4C7A-3854-7B4B-8D4F-4AD959A565DC}"/>
+          </ac:spMkLst>
+        </pc:spChg>
+      </pc:sldChg>
+    </pc:docChg>
+  </pc:docChgLst>
+</pc:chgInfo>
+</file>
+
 <file path=ppt/notesMasters/notesMaster1.xml><?xml version="1.0" encoding="utf-8"?>
 <p:notesMaster xmlns:a="http://schemas.openxmlformats.org/drawingml/2006/main" xmlns:r="http://schemas.openxmlformats.org/officeDocument/2006/relationships" xmlns:p="http://schemas.openxmlformats.org/presentationml/2006/main">
   <p:cSld>
@@ -213,7 +250,7 @@
           <a:p>
             <a:fld id="{92107E4A-59D9-C648-BC62-133DA4EC414F}" type="datetimeFigureOut">
               <a:rPr lang="en-US" smtClean="0"/>
-              <a:t>4/29/2022</a:t>
+              <a:t>2/17/23</a:t>
             </a:fld>
             <a:endParaRPr lang="en-US"/>
           </a:p>
@@ -619,7 +656,7 @@
           <a:p>
             <a:fld id="{4AB1357F-A277-7442-BEE7-4FE250216E54}" type="datetimeFigureOut">
               <a:rPr lang="en-US" smtClean="0"/>
-              <a:t>4/29/2022</a:t>
+              <a:t>2/17/23</a:t>
             </a:fld>
             <a:endParaRPr lang="en-US"/>
           </a:p>
@@ -830,7 +867,7 @@
           <a:p>
             <a:fld id="{4AB1357F-A277-7442-BEE7-4FE250216E54}" type="datetimeFigureOut">
               <a:rPr lang="en-US" smtClean="0"/>
-              <a:t>4/29/2022</a:t>
+              <a:t>2/17/23</a:t>
             </a:fld>
             <a:endParaRPr lang="en-US"/>
           </a:p>
@@ -1045,7 +1082,7 @@
           <a:p>
             <a:fld id="{4AB1357F-A277-7442-BEE7-4FE250216E54}" type="datetimeFigureOut">
               <a:rPr lang="en-US" smtClean="0"/>
-              <a:t>4/29/2022</a:t>
+              <a:t>2/17/23</a:t>
             </a:fld>
             <a:endParaRPr lang="en-US"/>
           </a:p>
@@ -1246,7 +1283,7 @@
           <a:p>
             <a:fld id="{4AB1357F-A277-7442-BEE7-4FE250216E54}" type="datetimeFigureOut">
               <a:rPr lang="en-US" smtClean="0"/>
-              <a:t>4/29/2022</a:t>
+              <a:t>2/17/23</a:t>
             </a:fld>
             <a:endParaRPr lang="en-US"/>
           </a:p>
@@ -1525,7 +1562,7 @@
           <a:p>
             <a:fld id="{4AB1357F-A277-7442-BEE7-4FE250216E54}" type="datetimeFigureOut">
               <a:rPr lang="en-US" smtClean="0"/>
-              <a:t>4/29/2022</a:t>
+              <a:t>2/17/23</a:t>
             </a:fld>
             <a:endParaRPr lang="en-US"/>
           </a:p>
@@ -1793,7 +1830,7 @@
           <a:p>
             <a:fld id="{4AB1357F-A277-7442-BEE7-4FE250216E54}" type="datetimeFigureOut">
               <a:rPr lang="en-US" smtClean="0"/>
-              <a:t>4/29/2022</a:t>
+              <a:t>2/17/23</a:t>
             </a:fld>
             <a:endParaRPr lang="en-US"/>
           </a:p>
@@ -2209,7 +2246,7 @@
           <a:p>
             <a:fld id="{4AB1357F-A277-7442-BEE7-4FE250216E54}" type="datetimeFigureOut">
               <a:rPr lang="en-US" smtClean="0"/>
-              <a:t>4/29/2022</a:t>
+              <a:t>2/17/23</a:t>
             </a:fld>
             <a:endParaRPr lang="en-US"/>
           </a:p>
@@ -2358,7 +2395,7 @@
           <a:p>
             <a:fld id="{4AB1357F-A277-7442-BEE7-4FE250216E54}" type="datetimeFigureOut">
               <a:rPr lang="en-US" smtClean="0"/>
-              <a:t>4/29/2022</a:t>
+              <a:t>2/17/23</a:t>
             </a:fld>
             <a:endParaRPr lang="en-US"/>
           </a:p>
@@ -2484,7 +2521,7 @@
           <a:p>
             <a:fld id="{4AB1357F-A277-7442-BEE7-4FE250216E54}" type="datetimeFigureOut">
               <a:rPr lang="en-US" smtClean="0"/>
-              <a:t>4/29/2022</a:t>
+              <a:t>2/17/23</a:t>
             </a:fld>
             <a:endParaRPr lang="en-US"/>
           </a:p>
@@ -2735,7 +2772,7 @@
           <a:p>
             <a:fld id="{4AB1357F-A277-7442-BEE7-4FE250216E54}" type="datetimeFigureOut">
               <a:rPr lang="en-US" smtClean="0"/>
-              <a:t>4/29/2022</a:t>
+              <a:t>2/17/23</a:t>
             </a:fld>
             <a:endParaRPr lang="en-US"/>
           </a:p>
@@ -3180,7 +3217,7 @@
           <a:p>
             <a:fld id="{4AB1357F-A277-7442-BEE7-4FE250216E54}" type="datetimeFigureOut">
               <a:rPr lang="en-US" smtClean="0"/>
-              <a:t>4/29/2022</a:t>
+              <a:t>2/17/23</a:t>
             </a:fld>
             <a:endParaRPr lang="en-US"/>
           </a:p>
@@ -3507,7 +3544,7 @@
           <a:p>
             <a:fld id="{4AB1357F-A277-7442-BEE7-4FE250216E54}" type="datetimeFigureOut">
               <a:rPr lang="en-US" smtClean="0"/>
-              <a:t>4/29/2022</a:t>
+              <a:t>2/17/23</a:t>
             </a:fld>
             <a:endParaRPr lang="en-US"/>
           </a:p>
@@ -4037,20 +4074,12 @@
               <a:rPr lang="en-US" sz="2400" dirty="0"/>
               <a:t>ULI101:  Introduction to Unix / Linux and the Internet</a:t>
             </a:r>
-            <a:r>
-              <a:rPr lang="en-US" dirty="0"/>
-              <a:t/>
-            </a:r>
             <a:br>
               <a:rPr lang="en-US" dirty="0"/>
             </a:br>
             <a:r>
               <a:rPr lang="en-US" sz="1200" dirty="0"/>
               <a:t> </a:t>
-            </a:r>
-            <a:r>
-              <a:rPr lang="en-US" dirty="0"/>
-              <a:t/>
             </a:r>
             <a:br>
               <a:rPr lang="en-US" dirty="0"/>
@@ -4072,23 +4101,7 @@
                   <a:srgbClr val="0070C0"/>
                 </a:solidFill>
               </a:rPr>
-              <a:t>Week </a:t>
-            </a:r>
-            <a:r>
-              <a:rPr lang="en-US" sz="2200" dirty="0" smtClean="0">
-                <a:solidFill>
-                  <a:srgbClr val="0070C0"/>
-                </a:solidFill>
-              </a:rPr>
-              <a:t>6 LESSON 1:</a:t>
-            </a:r>
-            <a:r>
-              <a:rPr lang="en-US" sz="2200" dirty="0">
-                <a:solidFill>
-                  <a:srgbClr val="0070C0"/>
-                </a:solidFill>
-              </a:rPr>
-              <a:t/>
+              <a:t>Week 6 LESSON 1:</a:t>
             </a:r>
             <a:br>
               <a:rPr lang="en-US" sz="2200" dirty="0">
@@ -4097,10 +4110,6 @@
                 </a:solidFill>
               </a:rPr>
             </a:br>
-            <a:r>
-              <a:rPr lang="en-US" sz="2200" dirty="0"/>
-              <a:t/>
-            </a:r>
             <a:br>
               <a:rPr lang="en-US" sz="2200" dirty="0"/>
             </a:br>
@@ -4135,17 +4144,9 @@
               </a:rPr>
               <a:t>   ISSUING REMOTE COMPUTER COMMANDS ON LOCAL COMPUTERS</a:t>
             </a:r>
-            <a:r>
-              <a:rPr lang="en-CA" dirty="0"/>
-              <a:t/>
-            </a:r>
             <a:br>
               <a:rPr lang="en-CA" dirty="0"/>
             </a:br>
-            <a:r>
-              <a:rPr lang="en-US" sz="2400" dirty="0"/>
-              <a:t/>
-            </a:r>
             <a:br>
               <a:rPr lang="en-US" sz="2400" dirty="0"/>
             </a:br>
@@ -4208,13 +4209,6 @@
   <p:clrMapOvr>
     <a:masterClrMapping/>
   </p:clrMapOvr>
-  <p:timing>
-    <p:tnLst>
-      <p:par>
-        <p:cTn id="1" dur="indefinite" restart="never" nodeType="tmRoot"/>
-      </p:par>
-    </p:tnLst>
-  </p:timing>
 </p:sld>
 </file>
 
@@ -4336,24 +4330,12 @@
               <a:rPr lang="en-CA" sz="2000" dirty="0"/>
               <a:t>files have been properly copied / transferred files between computers..</a:t>
             </a:r>
-            <a:r>
-              <a:rPr lang="en-CA" sz="1400" dirty="0"/>
-              <a:t/>
-            </a:r>
             <a:br>
               <a:rPr lang="en-CA" sz="1400" dirty="0"/>
             </a:br>
-            <a:r>
-              <a:rPr lang="en-CA" sz="1200" dirty="0"/>
-              <a:t/>
-            </a:r>
             <a:br>
               <a:rPr lang="en-CA" sz="1200" dirty="0"/>
             </a:br>
-            <a:r>
-              <a:rPr lang="en-CA" sz="1200" dirty="0"/>
-              <a:t/>
-            </a:r>
             <a:br>
               <a:rPr lang="en-CA" sz="1200" dirty="0"/>
             </a:br>
@@ -4391,7 +4373,7 @@
           <a:blip r:embed="rId2">
             <a:extLst>
               <a:ext uri="{837473B0-CC2E-450A-ABE3-18F120FF3D39}">
-                <a1611:picAttrSrcUrl xmlns="" xmlns:a1611="http://schemas.microsoft.com/office/drawing/2016/11/main" r:id="rId3"/>
+                <a1611:picAttrSrcUrl xmlns:a1611="http://schemas.microsoft.com/office/drawing/2016/11/main" r:id="rId3"/>
               </a:ext>
             </a:extLst>
           </a:blip>
@@ -4688,82 +4670,66 @@
               <a:buNone/>
             </a:pPr>
             <a:r>
-              <a:rPr lang="en-CA" b="1" dirty="0" smtClean="0"/>
+              <a:rPr lang="en-CA" b="1" dirty="0"/>
               <a:t>NOTE:  </a:t>
             </a:r>
             <a:r>
-              <a:rPr lang="en-CA" dirty="0" smtClean="0"/>
+              <a:rPr lang="en-CA" dirty="0"/>
               <a:t>Based on issues with the implementation of the Seneca VPN, you cannot connect to your Matrix account unless you run the graphical SSH Client application via </a:t>
             </a:r>
             <a:r>
-              <a:rPr lang="en-CA" b="1" dirty="0" err="1" smtClean="0"/>
+              <a:rPr lang="en-CA" b="1" dirty="0" err="1"/>
               <a:t>MyApps</a:t>
             </a:r>
             <a:r>
-              <a:rPr lang="en-CA" dirty="0" smtClean="0"/>
+              <a:rPr lang="en-CA" dirty="0"/>
               <a:t> at a Seneca computer lab.</a:t>
             </a:r>
             <a:br>
-              <a:rPr lang="en-CA" dirty="0" smtClean="0"/>
+              <a:rPr lang="en-CA" dirty="0"/>
             </a:br>
-            <a:endParaRPr lang="en-CA" dirty="0" smtClean="0"/>
+            <a:endParaRPr lang="en-CA" dirty="0"/>
           </a:p>
           <a:p>
             <a:pPr marL="0" indent="0">
               <a:buNone/>
             </a:pPr>
             <a:r>
-              <a:rPr lang="en-CA" dirty="0" smtClean="0"/>
+              <a:rPr lang="en-CA" dirty="0"/>
               <a:t>You can refer to </a:t>
             </a:r>
             <a:r>
-              <a:rPr lang="en-CA" b="1" dirty="0" smtClean="0"/>
+              <a:rPr lang="en-CA" b="1" dirty="0"/>
               <a:t>Online Tutorial 1 INVESIGATION1 </a:t>
             </a:r>
             <a:r>
-              <a:rPr lang="en-CA" dirty="0" smtClean="0"/>
+              <a:rPr lang="en-CA" dirty="0"/>
               <a:t>to run the</a:t>
             </a:r>
             <a:br>
-              <a:rPr lang="en-CA" dirty="0" smtClean="0"/>
+              <a:rPr lang="en-CA" dirty="0"/>
             </a:br>
             <a:r>
-              <a:rPr lang="en-CA" dirty="0" smtClean="0"/>
+              <a:rPr lang="en-CA" dirty="0"/>
               <a:t>graphical SSH Client application via </a:t>
             </a:r>
             <a:r>
-              <a:rPr lang="en-CA" dirty="0" err="1" smtClean="0"/>
+              <a:rPr lang="en-CA" dirty="0" err="1"/>
               <a:t>MyApps</a:t>
             </a:r>
             <a:r>
-              <a:rPr lang="en-CA" dirty="0" smtClean="0"/>
+              <a:rPr lang="en-CA" dirty="0"/>
               <a:t> at Seneca.</a:t>
             </a:r>
-            <a:r>
-              <a:rPr lang="en-CA" dirty="0"/>
-              <a:t/>
-            </a:r>
             <a:br>
               <a:rPr lang="en-CA" dirty="0"/>
             </a:br>
-            <a:r>
-              <a:rPr lang="en-CA" dirty="0"/>
-              <a:t/>
-            </a:r>
             <a:br>
               <a:rPr lang="en-CA" dirty="0"/>
             </a:br>
-            <a:r>
-              <a:rPr lang="en-CA" dirty="0"/>
-              <a:t/>
-            </a:r>
             <a:br>
               <a:rPr lang="en-CA" dirty="0"/>
             </a:br>
-            <a:r>
-              <a:rPr lang="en-CA" dirty="0"/>
-              <a:t/>
-            </a:r>
             <a:br>
               <a:rPr lang="en-CA" dirty="0"/>
             </a:br>
@@ -5218,37 +5184,21 @@
             </a:br>
             <a:r>
               <a:rPr lang="en-CA" sz="2000" dirty="0"/>
-              <a:t>and the Secure Shell graphical SFTP </a:t>
-            </a:r>
-            <a:r>
-              <a:rPr lang="en-CA" sz="2000" dirty="0" smtClean="0"/>
-              <a:t>application </a:t>
+              <a:t>and the Secure Shell graphical SFTP application </a:t>
             </a:r>
             <a:br>
-              <a:rPr lang="en-CA" sz="2000" dirty="0" smtClean="0"/>
+              <a:rPr lang="en-CA" sz="2000" dirty="0"/>
             </a:br>
             <a:r>
-              <a:rPr lang="en-CA" sz="2000" dirty="0" smtClean="0"/>
+              <a:rPr lang="en-CA" sz="2000" dirty="0"/>
               <a:t>(if at Seneca computer lab).</a:t>
-            </a:r>
-            <a:r>
-              <a:rPr lang="en-CA" sz="1400" dirty="0"/>
-              <a:t/>
             </a:r>
             <a:br>
               <a:rPr lang="en-CA" sz="1400" dirty="0"/>
             </a:br>
-            <a:r>
-              <a:rPr lang="en-CA" sz="1200" dirty="0"/>
-              <a:t/>
-            </a:r>
             <a:br>
               <a:rPr lang="en-CA" sz="1200" dirty="0"/>
             </a:br>
-            <a:r>
-              <a:rPr lang="en-CA" sz="1200" dirty="0"/>
-              <a:t/>
-            </a:r>
             <a:br>
               <a:rPr lang="en-CA" sz="1200" dirty="0"/>
             </a:br>
@@ -5286,7 +5236,7 @@
           <a:blip r:embed="rId2">
             <a:extLst>
               <a:ext uri="{837473B0-CC2E-450A-ABE3-18F120FF3D39}">
-                <a1611:picAttrSrcUrl xmlns="" xmlns:a1611="http://schemas.microsoft.com/office/drawing/2016/11/main" r:id="rId3"/>
+                <a1611:picAttrSrcUrl xmlns:a1611="http://schemas.microsoft.com/office/drawing/2016/11/main" r:id="rId3"/>
               </a:ext>
             </a:extLst>
           </a:blip>
@@ -5570,10 +5520,6 @@
             <a:pPr marL="0" indent="0">
               <a:buNone/>
             </a:pPr>
-            <a:r>
-              <a:rPr lang="en-CA" dirty="0"/>
-              <a:t/>
-            </a:r>
             <a:br>
               <a:rPr lang="en-CA" dirty="0"/>
             </a:br>
@@ -5612,45 +5558,21 @@
             <a:br>
               <a:rPr lang="en-CA" dirty="0"/>
             </a:br>
-            <a:r>
-              <a:rPr lang="en-CA" dirty="0"/>
-              <a:t/>
-            </a:r>
             <a:br>
               <a:rPr lang="en-CA" dirty="0"/>
             </a:br>
-            <a:r>
-              <a:rPr lang="en-CA" dirty="0"/>
-              <a:t/>
-            </a:r>
             <a:br>
               <a:rPr lang="en-CA" dirty="0"/>
             </a:br>
-            <a:r>
-              <a:rPr lang="en-CA" dirty="0"/>
-              <a:t/>
-            </a:r>
             <a:br>
               <a:rPr lang="en-CA" dirty="0"/>
             </a:br>
-            <a:r>
-              <a:rPr lang="en-CA" dirty="0"/>
-              <a:t/>
-            </a:r>
             <a:br>
               <a:rPr lang="en-CA" dirty="0"/>
             </a:br>
-            <a:r>
-              <a:rPr lang="en-CA" dirty="0"/>
-              <a:t/>
-            </a:r>
             <a:br>
               <a:rPr lang="en-CA" dirty="0"/>
             </a:br>
-            <a:r>
-              <a:rPr lang="en-CA" dirty="0"/>
-              <a:t/>
-            </a:r>
             <a:br>
               <a:rPr lang="en-CA" dirty="0"/>
             </a:br>
@@ -5963,10 +5885,6 @@
             <a:br>
               <a:rPr lang="en-CA" b="1" dirty="0"/>
             </a:br>
-            <a:r>
-              <a:rPr lang="en-CA" b="1" dirty="0"/>
-              <a:t/>
-            </a:r>
             <a:br>
               <a:rPr lang="en-CA" b="1" dirty="0"/>
             </a:br>
@@ -6139,10 +6057,6 @@
               <a:rPr lang="en-CA" i="1" dirty="0"/>
               <a:t>Example:</a:t>
             </a:r>
-            <a:r>
-              <a:rPr lang="en-CA" dirty="0"/>
-              <a:t/>
-            </a:r>
             <a:br>
               <a:rPr lang="en-CA" dirty="0"/>
             </a:br>
@@ -6176,24 +6090,12 @@
             <a:pPr marL="0" indent="0">
               <a:buNone/>
             </a:pPr>
-            <a:r>
-              <a:rPr lang="en-CA" dirty="0"/>
-              <a:t/>
-            </a:r>
             <a:br>
               <a:rPr lang="en-CA" dirty="0"/>
             </a:br>
-            <a:r>
-              <a:rPr lang="en-CA" dirty="0"/>
-              <a:t/>
-            </a:r>
             <a:br>
               <a:rPr lang="en-CA" dirty="0"/>
             </a:br>
-            <a:r>
-              <a:rPr lang="en-CA" dirty="0"/>
-              <a:t/>
-            </a:r>
             <a:br>
               <a:rPr lang="en-CA" dirty="0"/>
             </a:br>
@@ -6719,10 +6621,6 @@
             <a:br>
               <a:rPr lang="en-CA" b="1" dirty="0"/>
             </a:br>
-            <a:r>
-              <a:rPr lang="en-CA" b="1" dirty="0"/>
-              <a:t/>
-            </a:r>
             <a:br>
               <a:rPr lang="en-CA" b="1" dirty="0"/>
             </a:br>
@@ -6804,10 +6702,6 @@
             <a:r>
               <a:rPr lang="en-CA" i="1" dirty="0"/>
               <a:t>Example:</a:t>
-            </a:r>
-            <a:r>
-              <a:rPr lang="en-CA" dirty="0"/>
-              <a:t/>
             </a:r>
             <a:br>
               <a:rPr lang="en-CA" dirty="0"/>
@@ -6839,78 +6733,36 @@
                 <a:cs typeface="Courier New" panose="02070309020205020404" pitchFamily="49" charset="0"/>
               </a:rPr>
             </a:br>
-            <a:r>
-              <a:rPr lang="en-CA" b="1" dirty="0">
-                <a:latin typeface="Courier New" panose="02070309020205020404" pitchFamily="49" charset="0"/>
-                <a:cs typeface="Courier New" panose="02070309020205020404" pitchFamily="49" charset="0"/>
-              </a:rPr>
-              <a:t/>
-            </a:r>
             <a:br>
               <a:rPr lang="en-CA" b="1" dirty="0">
                 <a:latin typeface="Courier New" panose="02070309020205020404" pitchFamily="49" charset="0"/>
                 <a:cs typeface="Courier New" panose="02070309020205020404" pitchFamily="49" charset="0"/>
               </a:rPr>
             </a:br>
-            <a:r>
-              <a:rPr lang="en-CA" b="1" dirty="0">
-                <a:latin typeface="Courier New" panose="02070309020205020404" pitchFamily="49" charset="0"/>
-                <a:cs typeface="Courier New" panose="02070309020205020404" pitchFamily="49" charset="0"/>
-              </a:rPr>
-              <a:t/>
-            </a:r>
             <a:br>
               <a:rPr lang="en-CA" b="1" dirty="0">
                 <a:latin typeface="Courier New" panose="02070309020205020404" pitchFamily="49" charset="0"/>
                 <a:cs typeface="Courier New" panose="02070309020205020404" pitchFamily="49" charset="0"/>
               </a:rPr>
             </a:br>
-            <a:r>
-              <a:rPr lang="en-CA" b="1" dirty="0">
-                <a:latin typeface="Courier New" panose="02070309020205020404" pitchFamily="49" charset="0"/>
-                <a:cs typeface="Courier New" panose="02070309020205020404" pitchFamily="49" charset="0"/>
-              </a:rPr>
-              <a:t/>
-            </a:r>
             <a:br>
               <a:rPr lang="en-CA" b="1" dirty="0">
                 <a:latin typeface="Courier New" panose="02070309020205020404" pitchFamily="49" charset="0"/>
                 <a:cs typeface="Courier New" panose="02070309020205020404" pitchFamily="49" charset="0"/>
               </a:rPr>
             </a:br>
-            <a:r>
-              <a:rPr lang="en-CA" b="1" dirty="0">
-                <a:latin typeface="Courier New" panose="02070309020205020404" pitchFamily="49" charset="0"/>
-                <a:cs typeface="Courier New" panose="02070309020205020404" pitchFamily="49" charset="0"/>
-              </a:rPr>
-              <a:t/>
-            </a:r>
             <a:br>
               <a:rPr lang="en-CA" b="1" dirty="0">
                 <a:latin typeface="Courier New" panose="02070309020205020404" pitchFamily="49" charset="0"/>
                 <a:cs typeface="Courier New" panose="02070309020205020404" pitchFamily="49" charset="0"/>
               </a:rPr>
             </a:br>
-            <a:r>
-              <a:rPr lang="en-CA" b="1" dirty="0">
-                <a:latin typeface="Courier New" panose="02070309020205020404" pitchFamily="49" charset="0"/>
-                <a:cs typeface="Courier New" panose="02070309020205020404" pitchFamily="49" charset="0"/>
-              </a:rPr>
-              <a:t/>
-            </a:r>
             <a:br>
               <a:rPr lang="en-CA" b="1" dirty="0">
                 <a:latin typeface="Courier New" panose="02070309020205020404" pitchFamily="49" charset="0"/>
                 <a:cs typeface="Courier New" panose="02070309020205020404" pitchFamily="49" charset="0"/>
               </a:rPr>
             </a:br>
-            <a:r>
-              <a:rPr lang="en-CA" b="1" dirty="0">
-                <a:latin typeface="Courier New" panose="02070309020205020404" pitchFamily="49" charset="0"/>
-                <a:cs typeface="Courier New" panose="02070309020205020404" pitchFamily="49" charset="0"/>
-              </a:rPr>
-              <a:t/>
-            </a:r>
             <a:br>
               <a:rPr lang="en-CA" b="1" dirty="0">
                 <a:latin typeface="Courier New" panose="02070309020205020404" pitchFamily="49" charset="0"/>
@@ -7379,24 +7231,12 @@
               <a:rPr lang="en-CA" sz="2000" dirty="0"/>
               <a:t> command.</a:t>
             </a:r>
-            <a:r>
-              <a:rPr lang="en-CA" sz="1400" dirty="0"/>
-              <a:t/>
-            </a:r>
             <a:br>
               <a:rPr lang="en-CA" sz="1400" dirty="0"/>
             </a:br>
-            <a:r>
-              <a:rPr lang="en-CA" sz="1200" dirty="0"/>
-              <a:t/>
-            </a:r>
             <a:br>
               <a:rPr lang="en-CA" sz="1200" dirty="0"/>
             </a:br>
-            <a:r>
-              <a:rPr lang="en-CA" sz="1200" dirty="0"/>
-              <a:t/>
-            </a:r>
             <a:br>
               <a:rPr lang="en-CA" sz="1200" dirty="0"/>
             </a:br>
@@ -7434,7 +7274,7 @@
           <a:blip r:embed="rId2">
             <a:extLst>
               <a:ext uri="{837473B0-CC2E-450A-ABE3-18F120FF3D39}">
-                <a1611:picAttrSrcUrl xmlns="" xmlns:a1611="http://schemas.microsoft.com/office/drawing/2016/11/main" r:id="rId3"/>
+                <a1611:picAttrSrcUrl xmlns:a1611="http://schemas.microsoft.com/office/drawing/2016/11/main" r:id="rId3"/>
               </a:ext>
             </a:extLst>
           </a:blip>
@@ -7622,7 +7462,7 @@
           <a:lstStyle/>
           <a:p>
             <a:r>
-              <a:rPr lang="en-US" sz="2800" dirty="0" smtClean="0"/>
+              <a:rPr lang="en-US" sz="2800" dirty="0"/>
               <a:t>HOMEWORK</a:t>
             </a:r>
             <a:endParaRPr lang="en-US" sz="3000" dirty="0"/>
@@ -7670,19 +7510,15 @@
               <a:buNone/>
             </a:pPr>
             <a:r>
-              <a:rPr lang="en-CA" dirty="0" smtClean="0"/>
+              <a:rPr lang="en-CA" dirty="0"/>
               <a:t>Perform </a:t>
             </a:r>
             <a:r>
               <a:rPr lang="en-CA" b="1" dirty="0"/>
-              <a:t>Week 6  Tutorial</a:t>
-            </a:r>
-            <a:r>
-              <a:rPr lang="en-CA" b="1" dirty="0" smtClean="0"/>
-              <a:t>:</a:t>
+              <a:t>Week 6  Tutorial:</a:t>
             </a:r>
             <a:br>
-              <a:rPr lang="en-CA" b="1" dirty="0" smtClean="0"/>
+              <a:rPr lang="en-CA" b="1" dirty="0"/>
             </a:br>
             <a:r>
               <a:rPr lang="en-US" sz="1600" b="1" spc="-1" dirty="0">
@@ -7690,23 +7526,7 @@
                   <a:srgbClr val="000000"/>
                 </a:solidFill>
               </a:rPr>
-              <a:t>(Due: Friday Week </a:t>
-            </a:r>
-            <a:r>
-              <a:rPr lang="en-US" sz="1600" b="1" spc="-1" dirty="0" smtClean="0">
-                <a:solidFill>
-                  <a:srgbClr val="000000"/>
-                </a:solidFill>
-              </a:rPr>
-              <a:t>8 </a:t>
-            </a:r>
-            <a:r>
-              <a:rPr lang="en-US" sz="1600" b="1" spc="-1" dirty="0">
-                <a:solidFill>
-                  <a:srgbClr val="000000"/>
-                </a:solidFill>
-              </a:rPr>
-              <a:t>@ midnight for a 2% grade)</a:t>
+              <a:t>(Due: Friday Week 8 @ midnight for a 2% grade)</a:t>
             </a:r>
             <a:r>
               <a:rPr lang="en-US" sz="1600" spc="-1" dirty="0">
@@ -7716,10 +7536,6 @@
               </a:rPr>
               <a:t>:</a:t>
             </a:r>
-            <a:r>
-              <a:rPr lang="en-CA" sz="1600" b="1" dirty="0"/>
-              <a:t/>
-            </a:r>
             <a:br>
               <a:rPr lang="en-CA" sz="1600" b="1" dirty="0"/>
             </a:br>
@@ -7733,10 +7549,6 @@
               </a:rPr>
               <a:t>INVESTIGATION 1: USING SECURE COPY</a:t>
             </a:r>
-            <a:r>
-              <a:rPr lang="en-CA" dirty="0"/>
-              <a:t/>
-            </a:r>
             <a:br>
               <a:rPr lang="en-CA" dirty="0"/>
             </a:br>
@@ -7750,10 +7562,6 @@
               </a:rPr>
               <a:t>INVESTIGATION 2: USING SECURE FILE TRANSMISSION CONTROL PROTOCOL</a:t>
             </a:r>
-            <a:r>
-              <a:rPr lang="en-CA" dirty="0"/>
-              <a:t/>
-            </a:r>
             <a:br>
               <a:rPr lang="en-CA" dirty="0"/>
             </a:br>
@@ -7787,23 +7595,11 @@
             </a:r>
             <a:r>
               <a:rPr lang="en-CA" dirty="0"/>
-              <a:t>1 – 12</a:t>
-            </a:r>
-            <a:r>
-              <a:rPr lang="en-CA" dirty="0" smtClean="0"/>
-              <a:t>)</a:t>
-            </a:r>
-            <a:r>
-              <a:rPr lang="en-CA" sz="1400" dirty="0"/>
-              <a:t/>
+              <a:t>1 – 12)</a:t>
             </a:r>
             <a:br>
               <a:rPr lang="en-CA" sz="1400" dirty="0"/>
             </a:br>
-            <a:r>
-              <a:rPr lang="en-CA" sz="1400" dirty="0"/>
-              <a:t/>
-            </a:r>
             <a:br>
               <a:rPr lang="en-CA" sz="1400" dirty="0"/>
             </a:br>
@@ -8180,17 +7976,9 @@
               <a:rPr lang="en-US" sz="2400" b="1" dirty="0"/>
               <a:t>Transferring Files Between Computers:</a:t>
             </a:r>
-            <a:r>
-              <a:rPr lang="en-US" b="1" dirty="0"/>
-              <a:t/>
-            </a:r>
             <a:br>
               <a:rPr lang="en-US" b="1" dirty="0"/>
             </a:br>
-            <a:r>
-              <a:rPr lang="en-US" b="1" dirty="0"/>
-              <a:t/>
-            </a:r>
             <a:br>
               <a:rPr lang="en-US" b="1" dirty="0"/>
             </a:br>
@@ -8887,20 +8675,12 @@
             <a:br>
               <a:rPr lang="en-CA" dirty="0"/>
             </a:br>
-            <a:r>
-              <a:rPr lang="en-CA" dirty="0"/>
-              <a:t/>
-            </a:r>
             <a:br>
               <a:rPr lang="en-CA" dirty="0"/>
             </a:br>
             <a:r>
               <a:rPr lang="en-CA" i="1" dirty="0"/>
               <a:t>Reasons for Transferring Files from Matrix:</a:t>
-            </a:r>
-            <a:r>
-              <a:rPr lang="en-CA" dirty="0"/>
-              <a:t/>
             </a:r>
             <a:br>
               <a:rPr lang="en-CA" dirty="0"/>
@@ -8956,31 +8736,15 @@
             <a:br>
               <a:rPr lang="en-CA" dirty="0"/>
             </a:br>
-            <a:r>
-              <a:rPr lang="en-CA" dirty="0"/>
-              <a:t/>
-            </a:r>
             <a:br>
               <a:rPr lang="en-CA" dirty="0"/>
             </a:br>
-            <a:r>
-              <a:rPr lang="en-CA" dirty="0"/>
-              <a:t/>
-            </a:r>
             <a:br>
               <a:rPr lang="en-CA" dirty="0"/>
             </a:br>
-            <a:r>
-              <a:rPr lang="en-CA" dirty="0"/>
-              <a:t/>
-            </a:r>
             <a:br>
               <a:rPr lang="en-CA" dirty="0"/>
             </a:br>
-            <a:r>
-              <a:rPr lang="en-CA" dirty="0"/>
-              <a:t/>
-            </a:r>
             <a:br>
               <a:rPr lang="en-CA" dirty="0"/>
             </a:br>
@@ -9006,7 +8770,7 @@
           <a:blip r:embed="rId2">
             <a:extLst>
               <a:ext uri="{837473B0-CC2E-450A-ABE3-18F120FF3D39}">
-                <a1611:picAttrSrcUrl xmlns="" xmlns:a1611="http://schemas.microsoft.com/office/drawing/2016/11/main" r:id="rId3"/>
+                <a1611:picAttrSrcUrl xmlns:a1611="http://schemas.microsoft.com/office/drawing/2016/11/main" r:id="rId3"/>
               </a:ext>
             </a:extLst>
           </a:blip>
@@ -9421,38 +9185,18 @@
             <a:br>
               <a:rPr lang="en-CA" dirty="0"/>
             </a:br>
-            <a:r>
-              <a:rPr lang="en-CA" dirty="0"/>
-              <a:t/>
-            </a:r>
             <a:br>
               <a:rPr lang="en-CA" dirty="0"/>
             </a:br>
-            <a:r>
-              <a:rPr lang="en-CA" dirty="0"/>
-              <a:t/>
-            </a:r>
             <a:br>
               <a:rPr lang="en-CA" dirty="0"/>
             </a:br>
-            <a:r>
-              <a:rPr lang="en-CA" dirty="0"/>
-              <a:t/>
-            </a:r>
             <a:br>
               <a:rPr lang="en-CA" dirty="0"/>
             </a:br>
-            <a:r>
-              <a:rPr lang="en-CA" dirty="0"/>
-              <a:t/>
-            </a:r>
             <a:br>
               <a:rPr lang="en-CA" dirty="0"/>
             </a:br>
-            <a:r>
-              <a:rPr lang="en-CA" dirty="0"/>
-              <a:t/>
-            </a:r>
             <a:br>
               <a:rPr lang="en-CA" dirty="0"/>
             </a:br>
@@ -9801,12 +9545,12 @@
         <p:spPr>
           <a:xfrm>
             <a:off x="1451578" y="1706813"/>
-            <a:ext cx="6778021" cy="4755771"/>
+            <a:ext cx="6778021" cy="4916725"/>
           </a:xfrm>
         </p:spPr>
         <p:txBody>
           <a:bodyPr>
-            <a:normAutofit fontScale="85000" lnSpcReduction="10000"/>
+            <a:normAutofit fontScale="85000" lnSpcReduction="20000"/>
           </a:bodyPr>
           <a:lstStyle/>
           <a:p>
@@ -9877,13 +9621,6 @@
                 <a:cs typeface="Courier New" panose="02070309020205020404" pitchFamily="49" charset="0"/>
               </a:rPr>
               <a:t>user@host:destination-pathname</a:t>
-            </a:r>
-            <a:r>
-              <a:rPr lang="en-CA" dirty="0">
-                <a:latin typeface="Courier New" panose="02070309020205020404" pitchFamily="49" charset="0"/>
-                <a:cs typeface="Courier New" panose="02070309020205020404" pitchFamily="49" charset="0"/>
-              </a:rPr>
-              <a:t/>
             </a:r>
             <a:br>
               <a:rPr lang="en-CA" dirty="0">
@@ -9966,13 +9703,6 @@
                 <a:cs typeface="Courier New" panose="02070309020205020404" pitchFamily="49" charset="0"/>
               </a:rPr>
               <a:t> local-pathname</a:t>
-            </a:r>
-            <a:r>
-              <a:rPr lang="en-CA" dirty="0">
-                <a:latin typeface="Courier New" panose="02070309020205020404" pitchFamily="49" charset="0"/>
-                <a:cs typeface="Courier New" panose="02070309020205020404" pitchFamily="49" charset="0"/>
-              </a:rPr>
-              <a:t/>
             </a:r>
             <a:br>
               <a:rPr lang="en-CA" dirty="0">
@@ -10091,12 +9821,46 @@
             </a:r>
             <a:r>
               <a:rPr lang="en-CA" b="1" dirty="0"/>
-              <a:t>-R</a:t>
+              <a:t>-r</a:t>
             </a:r>
             <a:r>
               <a:rPr lang="en-CA" dirty="0"/>
               <a:t>) is supported.</a:t>
             </a:r>
+          </a:p>
+          <a:p>
+            <a:pPr marL="0" indent="0">
+              <a:buNone/>
+            </a:pPr>
+            <a:r>
+              <a:rPr lang="en-CA" sz="1600" dirty="0"/>
+              <a:t>(</a:t>
+            </a:r>
+            <a:r>
+              <a:rPr lang="en-CA" sz="1600" b="1" dirty="0"/>
+              <a:t>Note: </a:t>
+            </a:r>
+            <a:r>
+              <a:rPr lang="en-CA" sz="1600" dirty="0"/>
+              <a:t>This command is case-sensitive. </a:t>
+            </a:r>
+            <a:r>
+              <a:rPr lang="en-CA" sz="1600" b="1" dirty="0"/>
+              <a:t>–r</a:t>
+            </a:r>
+            <a:r>
+              <a:rPr lang="en-CA" sz="1600" dirty="0"/>
+              <a:t> is supported, but </a:t>
+            </a:r>
+            <a:r>
+              <a:rPr lang="en-CA" sz="1600" b="1" dirty="0"/>
+              <a:t>–R</a:t>
+            </a:r>
+            <a:r>
+              <a:rPr lang="en-CA" sz="1600" dirty="0"/>
+              <a:t> is not.)</a:t>
+            </a:r>
+            <a:endParaRPr lang="en-CA" dirty="0"/>
           </a:p>
           <a:p>
             <a:pPr marL="0" indent="0">
@@ -10455,6 +10219,55 @@
                       </p:childTnLst>
                     </p:cTn>
                   </p:par>
+                  <p:par>
+                    <p:cTn id="23" fill="hold">
+                      <p:stCondLst>
+                        <p:cond delay="indefinite"/>
+                      </p:stCondLst>
+                      <p:childTnLst>
+                        <p:par>
+                          <p:cTn id="24" fill="hold">
+                            <p:stCondLst>
+                              <p:cond delay="0"/>
+                            </p:stCondLst>
+                            <p:childTnLst>
+                              <p:par>
+                                <p:cTn id="25" presetID="1" presetClass="entr" presetSubtype="0" fill="hold" grpId="0" nodeType="clickEffect">
+                                  <p:stCondLst>
+                                    <p:cond delay="0"/>
+                                  </p:stCondLst>
+                                  <p:childTnLst>
+                                    <p:set>
+                                      <p:cBhvr>
+                                        <p:cTn id="26" dur="1" fill="hold">
+                                          <p:stCondLst>
+                                            <p:cond delay="0"/>
+                                          </p:stCondLst>
+                                        </p:cTn>
+                                        <p:tgtEl>
+                                          <p:spTgt spid="3">
+                                            <p:txEl>
+                                              <p:pRg st="6" end="6"/>
+                                            </p:txEl>
+                                          </p:spTgt>
+                                        </p:tgtEl>
+                                        <p:attrNameLst>
+                                          <p:attrName>style.visibility</p:attrName>
+                                        </p:attrNameLst>
+                                      </p:cBhvr>
+                                      <p:to>
+                                        <p:strVal val="visible"/>
+                                      </p:to>
+                                    </p:set>
+                                  </p:childTnLst>
+                                </p:cTn>
+                              </p:par>
+                            </p:childTnLst>
+                          </p:cTn>
+                        </p:par>
+                      </p:childTnLst>
+                    </p:cTn>
+                  </p:par>
                 </p:childTnLst>
               </p:cTn>
               <p:prevCondLst>
@@ -10587,24 +10400,12 @@
               <a:rPr lang="en-CA" sz="2000" dirty="0"/>
               <a:t> command.</a:t>
             </a:r>
-            <a:r>
-              <a:rPr lang="en-CA" sz="1400" dirty="0"/>
-              <a:t/>
-            </a:r>
             <a:br>
               <a:rPr lang="en-CA" sz="1400" dirty="0"/>
             </a:br>
-            <a:r>
-              <a:rPr lang="en-CA" sz="1200" dirty="0"/>
-              <a:t/>
-            </a:r>
             <a:br>
               <a:rPr lang="en-CA" sz="1200" dirty="0"/>
             </a:br>
-            <a:r>
-              <a:rPr lang="en-CA" sz="1200" dirty="0"/>
-              <a:t/>
-            </a:r>
             <a:br>
               <a:rPr lang="en-CA" sz="1200" dirty="0"/>
             </a:br>
@@ -10642,7 +10443,7 @@
           <a:blip r:embed="rId2">
             <a:extLst>
               <a:ext uri="{837473B0-CC2E-450A-ABE3-18F120FF3D39}">
-                <a1611:picAttrSrcUrl xmlns="" xmlns:a1611="http://schemas.microsoft.com/office/drawing/2016/11/main" r:id="rId3"/>
+                <a1611:picAttrSrcUrl xmlns:a1611="http://schemas.microsoft.com/office/drawing/2016/11/main" r:id="rId3"/>
               </a:ext>
             </a:extLst>
           </a:blip>
@@ -10875,10 +10676,6 @@
             <a:br>
               <a:rPr lang="en-CA" b="1" dirty="0"/>
             </a:br>
-            <a:r>
-              <a:rPr lang="en-CA" b="1" dirty="0"/>
-              <a:t/>
-            </a:r>
             <a:br>
               <a:rPr lang="en-CA" b="1" dirty="0"/>
             </a:br>
@@ -10917,10 +10714,6 @@
             <a:pPr marL="0" indent="0">
               <a:buNone/>
             </a:pPr>
-            <a:r>
-              <a:rPr lang="en-CA" b="1" dirty="0"/>
-              <a:t/>
-            </a:r>
             <a:br>
               <a:rPr lang="en-CA" b="1" dirty="0"/>
             </a:br>
@@ -10965,45 +10758,21 @@
             <a:br>
               <a:rPr lang="en-CA" dirty="0"/>
             </a:br>
-            <a:r>
-              <a:rPr lang="en-CA" dirty="0"/>
-              <a:t/>
-            </a:r>
             <a:br>
               <a:rPr lang="en-CA" dirty="0"/>
             </a:br>
-            <a:r>
-              <a:rPr lang="en-CA" dirty="0"/>
-              <a:t/>
-            </a:r>
             <a:br>
               <a:rPr lang="en-CA" dirty="0"/>
             </a:br>
-            <a:r>
-              <a:rPr lang="en-CA" dirty="0"/>
-              <a:t/>
-            </a:r>
             <a:br>
               <a:rPr lang="en-CA" dirty="0"/>
             </a:br>
-            <a:r>
-              <a:rPr lang="en-CA" dirty="0"/>
-              <a:t/>
-            </a:r>
             <a:br>
               <a:rPr lang="en-CA" dirty="0"/>
             </a:br>
-            <a:r>
-              <a:rPr lang="en-CA" dirty="0"/>
-              <a:t/>
-            </a:r>
             <a:br>
               <a:rPr lang="en-CA" dirty="0"/>
             </a:br>
-            <a:r>
-              <a:rPr lang="en-CA" dirty="0"/>
-              <a:t/>
-            </a:r>
             <a:br>
               <a:rPr lang="en-CA" dirty="0"/>
             </a:br>
@@ -11801,7 +11570,7 @@
           <a:blip r:embed="rId2">
             <a:extLst>
               <a:ext uri="{837473B0-CC2E-450A-ABE3-18F120FF3D39}">
-                <a1611:picAttrSrcUrl xmlns="" xmlns:a1611="http://schemas.microsoft.com/office/drawing/2016/11/main" r:id="rId3"/>
+                <a1611:picAttrSrcUrl xmlns:a1611="http://schemas.microsoft.com/office/drawing/2016/11/main" r:id="rId3"/>
               </a:ext>
             </a:extLst>
           </a:blip>
@@ -12148,10 +11917,6 @@
               <a:rPr lang="en-CA" sz="2400" b="1" dirty="0"/>
               <a:t>on your Local Computer</a:t>
             </a:r>
-            <a:r>
-              <a:rPr lang="en-CA" dirty="0"/>
-              <a:t/>
-            </a:r>
             <a:br>
               <a:rPr lang="en-CA" dirty="0"/>
             </a:br>
@@ -12206,17 +11971,9 @@
             <a:br>
               <a:rPr lang="en-CA" dirty="0"/>
             </a:br>
-            <a:r>
-              <a:rPr lang="en-CA" dirty="0"/>
-              <a:t/>
-            </a:r>
             <a:br>
               <a:rPr lang="en-CA" dirty="0"/>
             </a:br>
-            <a:r>
-              <a:rPr lang="en-CA" dirty="0"/>
-              <a:t/>
-            </a:r>
             <a:br>
               <a:rPr lang="en-CA" dirty="0"/>
             </a:br>
@@ -12257,13 +12014,6 @@
                 <a:cs typeface="Courier New" panose="02070309020205020404" pitchFamily="49" charset="0"/>
               </a:rPr>
               <a:t>ls -l</a:t>
-            </a:r>
-            <a:r>
-              <a:rPr lang="en-CA" b="1" dirty="0">
-                <a:latin typeface="Courier New" panose="02070309020205020404" pitchFamily="49" charset="0"/>
-                <a:cs typeface="Courier New" panose="02070309020205020404" pitchFamily="49" charset="0"/>
-              </a:rPr>
-              <a:t/>
             </a:r>
             <a:br>
               <a:rPr lang="en-CA" b="1" dirty="0">
@@ -12303,17 +12053,9 @@
             <a:br>
               <a:rPr lang="en-CA" dirty="0"/>
             </a:br>
-            <a:r>
-              <a:rPr lang="en-CA" dirty="0"/>
-              <a:t/>
-            </a:r>
             <a:br>
               <a:rPr lang="en-CA" dirty="0"/>
             </a:br>
-            <a:r>
-              <a:rPr lang="en-CA" dirty="0"/>
-              <a:t/>
-            </a:r>
             <a:br>
               <a:rPr lang="en-CA" dirty="0"/>
             </a:br>

</xml_diff>